<commit_message>
Update the slides with the new commands and add the plain text files
</commit_message>
<xml_diff>
--- a/Section 10 - Heroku.pptx
+++ b/Section 10 - Heroku.pptx
@@ -250,7 +250,7 @@
           <a:p>
             <a:fld id="{C1B4A547-92C3-7C4C-BEB9-53C9435B0722}" type="datetimeFigureOut">
               <a:rPr lang="en-US" smtClean="0"/>
-              <a:t>10/11/18</a:t>
+              <a:t>12/14/18</a:t>
             </a:fld>
             <a:endParaRPr lang="en-US"/>
           </a:p>
@@ -420,7 +420,7 @@
           <a:p>
             <a:fld id="{C1B4A547-92C3-7C4C-BEB9-53C9435B0722}" type="datetimeFigureOut">
               <a:rPr lang="en-US" smtClean="0"/>
-              <a:t>10/11/18</a:t>
+              <a:t>12/14/18</a:t>
             </a:fld>
             <a:endParaRPr lang="en-US"/>
           </a:p>
@@ -600,7 +600,7 @@
           <a:p>
             <a:fld id="{C1B4A547-92C3-7C4C-BEB9-53C9435B0722}" type="datetimeFigureOut">
               <a:rPr lang="en-US" smtClean="0"/>
-              <a:t>10/11/18</a:t>
+              <a:t>12/14/18</a:t>
             </a:fld>
             <a:endParaRPr lang="en-US"/>
           </a:p>
@@ -770,7 +770,7 @@
           <a:p>
             <a:fld id="{C1B4A547-92C3-7C4C-BEB9-53C9435B0722}" type="datetimeFigureOut">
               <a:rPr lang="en-US" smtClean="0"/>
-              <a:t>10/11/18</a:t>
+              <a:t>12/14/18</a:t>
             </a:fld>
             <a:endParaRPr lang="en-US"/>
           </a:p>
@@ -1016,7 +1016,7 @@
           <a:p>
             <a:fld id="{C1B4A547-92C3-7C4C-BEB9-53C9435B0722}" type="datetimeFigureOut">
               <a:rPr lang="en-US" smtClean="0"/>
-              <a:t>10/11/18</a:t>
+              <a:t>12/14/18</a:t>
             </a:fld>
             <a:endParaRPr lang="en-US"/>
           </a:p>
@@ -1248,7 +1248,7 @@
           <a:p>
             <a:fld id="{C1B4A547-92C3-7C4C-BEB9-53C9435B0722}" type="datetimeFigureOut">
               <a:rPr lang="en-US" smtClean="0"/>
-              <a:t>10/11/18</a:t>
+              <a:t>12/14/18</a:t>
             </a:fld>
             <a:endParaRPr lang="en-US"/>
           </a:p>
@@ -1615,7 +1615,7 @@
           <a:p>
             <a:fld id="{C1B4A547-92C3-7C4C-BEB9-53C9435B0722}" type="datetimeFigureOut">
               <a:rPr lang="en-US" smtClean="0"/>
-              <a:t>10/11/18</a:t>
+              <a:t>12/14/18</a:t>
             </a:fld>
             <a:endParaRPr lang="en-US"/>
           </a:p>
@@ -1733,7 +1733,7 @@
           <a:p>
             <a:fld id="{C1B4A547-92C3-7C4C-BEB9-53C9435B0722}" type="datetimeFigureOut">
               <a:rPr lang="en-US" smtClean="0"/>
-              <a:t>10/11/18</a:t>
+              <a:t>12/14/18</a:t>
             </a:fld>
             <a:endParaRPr lang="en-US"/>
           </a:p>
@@ -1828,7 +1828,7 @@
           <a:p>
             <a:fld id="{C1B4A547-92C3-7C4C-BEB9-53C9435B0722}" type="datetimeFigureOut">
               <a:rPr lang="en-US" smtClean="0"/>
-              <a:t>10/11/18</a:t>
+              <a:t>12/14/18</a:t>
             </a:fld>
             <a:endParaRPr lang="en-US"/>
           </a:p>
@@ -2105,7 +2105,7 @@
           <a:p>
             <a:fld id="{C1B4A547-92C3-7C4C-BEB9-53C9435B0722}" type="datetimeFigureOut">
               <a:rPr lang="en-US" smtClean="0"/>
-              <a:t>10/11/18</a:t>
+              <a:t>12/14/18</a:t>
             </a:fld>
             <a:endParaRPr lang="en-US"/>
           </a:p>
@@ -2358,7 +2358,7 @@
           <a:p>
             <a:fld id="{C1B4A547-92C3-7C4C-BEB9-53C9435B0722}" type="datetimeFigureOut">
               <a:rPr lang="en-US" smtClean="0"/>
-              <a:t>10/11/18</a:t>
+              <a:t>12/14/18</a:t>
             </a:fld>
             <a:endParaRPr lang="en-US"/>
           </a:p>
@@ -2571,7 +2571,7 @@
           <a:p>
             <a:fld id="{C1B4A547-92C3-7C4C-BEB9-53C9435B0722}" type="datetimeFigureOut">
               <a:rPr lang="en-US" smtClean="0"/>
-              <a:t>10/11/18</a:t>
+              <a:t>12/14/18</a:t>
             </a:fld>
             <a:endParaRPr lang="en-US"/>
           </a:p>
@@ -3024,15 +3024,37 @@
               <a:t>Ruby on Rails </a:t>
             </a:r>
             <a:r>
-              <a:rPr lang="mr-IN" sz="3600" b="1" dirty="0">
-                <a:solidFill>
-                  <a:srgbClr val="211F6B"/>
-                </a:solidFill>
-                <a:latin typeface="RawengulkSans" charset="0"/>
-                <a:ea typeface="RawengulkSans" charset="0"/>
-                <a:cs typeface="RawengulkSans" charset="0"/>
-              </a:rPr>
-              <a:t>–</a:t>
+              <a:rPr lang="es-ES" sz="3600" b="1" dirty="0" smtClean="0">
+                <a:solidFill>
+                  <a:srgbClr val="211F6B"/>
+                </a:solidFill>
+                <a:latin typeface="RawengulkSans" charset="0"/>
+                <a:ea typeface="RawengulkSans" charset="0"/>
+                <a:cs typeface="RawengulkSans" charset="0"/>
+              </a:rPr>
+              <a:t>- </a:t>
+            </a:r>
+            <a:r>
+              <a:rPr lang="en-US" sz="3600" b="1" dirty="0" err="1" smtClean="0">
+                <a:solidFill>
+                  <a:srgbClr val="211F6B"/>
+                </a:solidFill>
+                <a:latin typeface="RawengulkSans" charset="0"/>
+                <a:ea typeface="RawengulkSans" charset="0"/>
+                <a:cs typeface="RawengulkSans" charset="0"/>
+              </a:rPr>
+              <a:t>Rspec</a:t>
+            </a:r>
+            <a:r>
+              <a:rPr lang="en-US" sz="3600" b="1" dirty="0" smtClean="0">
+                <a:solidFill>
+                  <a:srgbClr val="211F6B"/>
+                </a:solidFill>
+                <a:latin typeface="RawengulkSans" charset="0"/>
+                <a:ea typeface="RawengulkSans" charset="0"/>
+                <a:cs typeface="RawengulkSans" charset="0"/>
+              </a:rPr>
+              <a:t> </a:t>
             </a:r>
             <a:r>
               <a:rPr lang="en-US" sz="3600" b="1" dirty="0">
@@ -3043,29 +3065,7 @@
                 <a:ea typeface="RawengulkSans" charset="0"/>
                 <a:cs typeface="RawengulkSans" charset="0"/>
               </a:rPr>
-              <a:t> BDD </a:t>
-            </a:r>
-            <a:r>
-              <a:rPr lang="en-US" sz="3600" b="1" dirty="0" err="1">
-                <a:solidFill>
-                  <a:srgbClr val="211F6B"/>
-                </a:solidFill>
-                <a:latin typeface="RawengulkSans" charset="0"/>
-                <a:ea typeface="RawengulkSans" charset="0"/>
-                <a:cs typeface="RawengulkSans" charset="0"/>
-              </a:rPr>
-              <a:t>Rspec</a:t>
-            </a:r>
-            <a:r>
-              <a:rPr lang="en-US" sz="3600" b="1" dirty="0">
-                <a:solidFill>
-                  <a:srgbClr val="211F6B"/>
-                </a:solidFill>
-                <a:latin typeface="RawengulkSans" charset="0"/>
-                <a:ea typeface="RawengulkSans" charset="0"/>
-                <a:cs typeface="RawengulkSans" charset="0"/>
-              </a:rPr>
-              <a:t> Capybara</a:t>
+              <a:t>Capybara</a:t>
             </a:r>
           </a:p>
         </p:txBody>
@@ -3268,22 +3268,10 @@
                 <a:cs typeface="RawengulkSans" charset="0"/>
                 <a:hlinkClick r:id="rId3"/>
               </a:rPr>
-              <a:t>https</a:t>
-            </a:r>
-            <a:r>
-              <a:rPr lang="en-US" b="1" dirty="0" smtClean="0">
-                <a:solidFill>
-                  <a:srgbClr val="211F6B"/>
-                </a:solidFill>
-                <a:latin typeface="RawengulkSans" charset="0"/>
-                <a:ea typeface="RawengulkSans" charset="0"/>
-                <a:cs typeface="RawengulkSans" charset="0"/>
-                <a:hlinkClick r:id="rId3"/>
-              </a:rPr>
-              <a:t>://heroku.com</a:t>
-            </a:r>
-            <a:r>
-              <a:rPr lang="en-US" b="1" dirty="0" smtClean="0">
+              <a:t>https://heroku.com</a:t>
+            </a:r>
+            <a:r>
+              <a:rPr lang="en-US" b="1" dirty="0">
                 <a:solidFill>
                   <a:srgbClr val="211F6B"/>
                 </a:solidFill>
@@ -3303,21 +3291,9 @@
                 <a:cs typeface="RawengulkSans" charset="0"/>
                 <a:hlinkClick r:id="rId4"/>
               </a:rPr>
-              <a:t>https://devcenter.heroku.com</a:t>
-            </a:r>
-            <a:r>
-              <a:rPr lang="en-US" b="1" dirty="0" smtClean="0">
-                <a:solidFill>
-                  <a:srgbClr val="211F6B"/>
-                </a:solidFill>
-                <a:latin typeface="RawengulkSans" charset="0"/>
-                <a:ea typeface="RawengulkSans" charset="0"/>
-                <a:cs typeface="RawengulkSans" charset="0"/>
-                <a:hlinkClick r:id="rId4"/>
-              </a:rPr>
-              <a:t>/</a:t>
-            </a:r>
-            <a:endParaRPr lang="en-US" b="1" dirty="0" smtClean="0">
+              <a:t>https://devcenter.heroku.com/</a:t>
+            </a:r>
+            <a:endParaRPr lang="en-US" b="1" dirty="0">
               <a:solidFill>
                 <a:srgbClr val="211F6B"/>
               </a:solidFill>
@@ -3327,7 +3303,7 @@
             </a:endParaRPr>
           </a:p>
           <a:p>
-            <a:endParaRPr lang="en-US" b="1" dirty="0" smtClean="0">
+            <a:endParaRPr lang="en-US" b="1" dirty="0">
               <a:solidFill>
                 <a:srgbClr val="211F6B"/>
               </a:solidFill>
@@ -3338,7 +3314,7 @@
           </a:p>
           <a:p>
             <a:r>
-              <a:rPr lang="en-US" b="1" dirty="0" smtClean="0">
+              <a:rPr lang="en-US" b="1" dirty="0">
                 <a:solidFill>
                   <a:srgbClr val="211F6B"/>
                 </a:solidFill>
@@ -3349,7 +3325,7 @@
               <a:t>What is </a:t>
             </a:r>
             <a:r>
-              <a:rPr lang="en-US" b="1" dirty="0" err="1" smtClean="0">
+              <a:rPr lang="en-US" b="1" dirty="0" err="1">
                 <a:solidFill>
                   <a:srgbClr val="211F6B"/>
                 </a:solidFill>
@@ -3380,21 +3356,9 @@
                 <a:cs typeface="RawengulkSans" charset="0"/>
                 <a:hlinkClick r:id="rId5"/>
               </a:rPr>
-              <a:t>https://</a:t>
-            </a:r>
-            <a:r>
-              <a:rPr lang="en-US" b="1" dirty="0" smtClean="0">
-                <a:solidFill>
-                  <a:srgbClr val="211F6B"/>
-                </a:solidFill>
-                <a:latin typeface="RawengulkSans" charset="0"/>
-                <a:ea typeface="RawengulkSans" charset="0"/>
-                <a:cs typeface="RawengulkSans" charset="0"/>
-                <a:hlinkClick r:id="rId5"/>
-              </a:rPr>
-              <a:t>www.heroku.com/what</a:t>
-            </a:r>
-            <a:endParaRPr lang="en-US" b="1" dirty="0" smtClean="0">
+              <a:t>https://www.heroku.com/what</a:t>
+            </a:r>
+            <a:endParaRPr lang="en-US" b="1" dirty="0">
               <a:solidFill>
                 <a:srgbClr val="211F6B"/>
               </a:solidFill>
@@ -3404,7 +3368,7 @@
             </a:endParaRPr>
           </a:p>
           <a:p>
-            <a:endParaRPr lang="en-US" b="1" dirty="0" smtClean="0">
+            <a:endParaRPr lang="en-US" b="1" dirty="0">
               <a:solidFill>
                 <a:srgbClr val="211F6B"/>
               </a:solidFill>
@@ -3438,7 +3402,7 @@
             </a:r>
           </a:p>
           <a:p>
-            <a:endParaRPr lang="en-US" b="1" dirty="0" smtClean="0">
+            <a:endParaRPr lang="en-US" b="1" dirty="0">
               <a:solidFill>
                 <a:srgbClr val="211F6B"/>
               </a:solidFill>
@@ -3469,22 +3433,10 @@
                 <a:cs typeface="RawengulkSans" charset="0"/>
                 <a:hlinkClick r:id="rId6"/>
               </a:rPr>
-              <a:t>https://</a:t>
-            </a:r>
-            <a:r>
-              <a:rPr lang="en-US" b="1" dirty="0" smtClean="0">
-                <a:solidFill>
-                  <a:srgbClr val="211F6B"/>
-                </a:solidFill>
-                <a:latin typeface="RawengulkSans" charset="0"/>
-                <a:ea typeface="RawengulkSans" charset="0"/>
-                <a:cs typeface="RawengulkSans" charset="0"/>
-                <a:hlinkClick r:id="rId6"/>
-              </a:rPr>
-              <a:t>signup.heroku.com/devcenter</a:t>
-            </a:r>
-            <a:r>
-              <a:rPr lang="en-US" b="1" dirty="0" smtClean="0">
+              <a:t>https://signup.heroku.com/devcenter</a:t>
+            </a:r>
+            <a:r>
+              <a:rPr lang="en-US" b="1" dirty="0">
                 <a:solidFill>
                   <a:srgbClr val="211F6B"/>
                 </a:solidFill>
@@ -3649,33 +3601,11 @@
         <p:spPr/>
         <p:txBody>
           <a:bodyPr>
-            <a:normAutofit lnSpcReduction="10000"/>
+            <a:normAutofit/>
           </a:bodyPr>
           <a:lstStyle/>
           <a:p>
             <a:r>
-              <a:rPr lang="en-US" b="1" dirty="0" smtClean="0">
-                <a:solidFill>
-                  <a:srgbClr val="211F6B"/>
-                </a:solidFill>
-                <a:latin typeface="RawengulkSans" charset="0"/>
-                <a:ea typeface="RawengulkSans" charset="0"/>
-                <a:cs typeface="RawengulkSans" charset="0"/>
-              </a:rPr>
-              <a:t>Install the </a:t>
-            </a:r>
-            <a:r>
-              <a:rPr lang="en-US" b="1" dirty="0" err="1" smtClean="0">
-                <a:solidFill>
-                  <a:srgbClr val="211F6B"/>
-                </a:solidFill>
-                <a:latin typeface="RawengulkSans" charset="0"/>
-                <a:ea typeface="RawengulkSans" charset="0"/>
-                <a:cs typeface="RawengulkSans" charset="0"/>
-              </a:rPr>
-              <a:t>heroku</a:t>
-            </a:r>
-            <a:r>
               <a:rPr lang="en-US" b="1" dirty="0">
                 <a:solidFill>
                   <a:srgbClr val="211F6B"/>
@@ -3684,68 +3614,22 @@
                 <a:ea typeface="RawengulkSans" charset="0"/>
                 <a:cs typeface="RawengulkSans" charset="0"/>
               </a:rPr>
-              <a:t>-CLI from here </a:t>
-            </a:r>
-            <a:r>
-              <a:rPr lang="en-US" b="1" dirty="0">
-                <a:solidFill>
-                  <a:srgbClr val="211F6B"/>
-                </a:solidFill>
-                <a:latin typeface="RawengulkSans" charset="0"/>
-                <a:ea typeface="RawengulkSans" charset="0"/>
-                <a:cs typeface="RawengulkSans" charset="0"/>
-                <a:hlinkClick r:id="rId3"/>
-              </a:rPr>
-              <a:t>https://</a:t>
-            </a:r>
-            <a:r>
-              <a:rPr lang="en-US" b="1" dirty="0" smtClean="0">
-                <a:solidFill>
-                  <a:srgbClr val="211F6B"/>
-                </a:solidFill>
-                <a:latin typeface="RawengulkSans" charset="0"/>
-                <a:ea typeface="RawengulkSans" charset="0"/>
-                <a:cs typeface="RawengulkSans" charset="0"/>
-                <a:hlinkClick r:id="rId3"/>
-              </a:rPr>
-              <a:t>devcenter.heroku.com/articles/heroku-cli#download-and-install</a:t>
-            </a:r>
-            <a:endParaRPr lang="en-US" b="1" dirty="0" smtClean="0">
-              <a:solidFill>
-                <a:srgbClr val="211F6B"/>
-              </a:solidFill>
-              <a:latin typeface="RawengulkSans" charset="0"/>
-              <a:ea typeface="RawengulkSans" charset="0"/>
-              <a:cs typeface="RawengulkSans" charset="0"/>
-            </a:endParaRPr>
-          </a:p>
-          <a:p>
-            <a:endParaRPr lang="en-US" b="1" dirty="0" smtClean="0">
-              <a:solidFill>
-                <a:srgbClr val="211F6B"/>
-              </a:solidFill>
-              <a:latin typeface="RawengulkSans" charset="0"/>
-              <a:ea typeface="RawengulkSans" charset="0"/>
-              <a:cs typeface="RawengulkSans" charset="0"/>
-            </a:endParaRPr>
-          </a:p>
-          <a:p>
-            <a:r>
-              <a:rPr lang="en-US" b="1" dirty="0" smtClean="0">
-                <a:solidFill>
-                  <a:srgbClr val="211F6B"/>
-                </a:solidFill>
-                <a:latin typeface="RawengulkSans" charset="0"/>
-                <a:ea typeface="RawengulkSans" charset="0"/>
-                <a:cs typeface="RawengulkSans" charset="0"/>
-              </a:rPr>
               <a:t>With this command:</a:t>
             </a:r>
           </a:p>
           <a:p>
-            <a:pPr marL="0" indent="0">
-              <a:buNone/>
-            </a:pPr>
+            <a:pPr lvl="1"/>
+            <a:r>
+              <a:rPr lang="en-US" dirty="0" err="1">
+                <a:solidFill>
+                  <a:srgbClr val="211F6B"/>
+                </a:solidFill>
+                <a:latin typeface="Courier New" charset="0"/>
+                <a:ea typeface="Courier New" charset="0"/>
+                <a:cs typeface="Courier New" charset="0"/>
+              </a:rPr>
+              <a:t>wget</a:t>
+            </a:r>
             <a:r>
               <a:rPr lang="en-US" dirty="0">
                 <a:solidFill>
@@ -3755,7 +3639,7 @@
                 <a:ea typeface="Courier New" charset="0"/>
                 <a:cs typeface="Courier New" charset="0"/>
               </a:rPr>
-              <a:t>curl https://cli-</a:t>
+              <a:t> -O- https://</a:t>
             </a:r>
             <a:r>
               <a:rPr lang="en-US" dirty="0" err="1">
@@ -3766,7 +3650,7 @@
                 <a:ea typeface="Courier New" charset="0"/>
                 <a:cs typeface="Courier New" charset="0"/>
               </a:rPr>
-              <a:t>assets.heroku.com</a:t>
+              <a:t>toolbelt.heroku.com</a:t>
             </a:r>
             <a:r>
               <a:rPr lang="en-US" dirty="0">
@@ -3802,7 +3686,7 @@
               <a:t> | </a:t>
             </a:r>
             <a:r>
-              <a:rPr lang="en-US" dirty="0" err="1" smtClean="0">
+              <a:rPr lang="en-US" dirty="0" err="1">
                 <a:solidFill>
                   <a:srgbClr val="211F6B"/>
                 </a:solidFill>
@@ -3812,7 +3696,7 @@
               </a:rPr>
               <a:t>sh</a:t>
             </a:r>
-            <a:endParaRPr lang="en-US" dirty="0" smtClean="0">
+            <a:endParaRPr lang="en-US" dirty="0">
               <a:solidFill>
                 <a:srgbClr val="211F6B"/>
               </a:solidFill>
@@ -3822,10 +3706,120 @@
             </a:endParaRPr>
           </a:p>
           <a:p>
-            <a:pPr marL="0" indent="0">
-              <a:buNone/>
-            </a:pPr>
-            <a:endParaRPr lang="en-US" b="1" dirty="0">
+            <a:r>
+              <a:rPr lang="en-US" b="1" dirty="0">
+                <a:solidFill>
+                  <a:srgbClr val="211F6B"/>
+                </a:solidFill>
+                <a:latin typeface="RawengulkSans" charset="0"/>
+                <a:ea typeface="RawengulkSans" charset="0"/>
+                <a:cs typeface="RawengulkSans" charset="0"/>
+              </a:rPr>
+              <a:t>Review the </a:t>
+            </a:r>
+            <a:r>
+              <a:rPr lang="en-US" b="1" dirty="0" err="1">
+                <a:solidFill>
+                  <a:srgbClr val="211F6B"/>
+                </a:solidFill>
+                <a:latin typeface="RawengulkSans" charset="0"/>
+                <a:ea typeface="RawengulkSans" charset="0"/>
+                <a:cs typeface="RawengulkSans" charset="0"/>
+              </a:rPr>
+              <a:t>heroku</a:t>
+            </a:r>
+            <a:r>
+              <a:rPr lang="en-US" b="1" dirty="0">
+                <a:solidFill>
+                  <a:srgbClr val="211F6B"/>
+                </a:solidFill>
+                <a:latin typeface="RawengulkSans" charset="0"/>
+                <a:ea typeface="RawengulkSans" charset="0"/>
+                <a:cs typeface="RawengulkSans" charset="0"/>
+              </a:rPr>
+              <a:t> version</a:t>
+            </a:r>
+          </a:p>
+          <a:p>
+            <a:pPr lvl="1"/>
+            <a:r>
+              <a:rPr lang="en-US" dirty="0">
+                <a:solidFill>
+                  <a:srgbClr val="211F6B"/>
+                </a:solidFill>
+                <a:latin typeface="Courier New" charset="0"/>
+                <a:ea typeface="Courier New" charset="0"/>
+                <a:cs typeface="Courier New" charset="0"/>
+              </a:rPr>
+              <a:t>H</a:t>
+            </a:r>
+            <a:r>
+              <a:rPr lang="es-ES" dirty="0" err="1">
+                <a:solidFill>
+                  <a:srgbClr val="211F6B"/>
+                </a:solidFill>
+                <a:latin typeface="Courier New" charset="0"/>
+                <a:ea typeface="Courier New" charset="0"/>
+                <a:cs typeface="Courier New" charset="0"/>
+              </a:rPr>
+              <a:t>eroku</a:t>
+            </a:r>
+            <a:r>
+              <a:rPr lang="es-ES" dirty="0">
+                <a:solidFill>
+                  <a:srgbClr val="211F6B"/>
+                </a:solidFill>
+                <a:latin typeface="Courier New" charset="0"/>
+                <a:ea typeface="Courier New" charset="0"/>
+                <a:cs typeface="Courier New" charset="0"/>
+              </a:rPr>
+              <a:t> --</a:t>
+            </a:r>
+            <a:r>
+              <a:rPr lang="es-ES" dirty="0" err="1">
+                <a:solidFill>
+                  <a:srgbClr val="211F6B"/>
+                </a:solidFill>
+                <a:latin typeface="Courier New" charset="0"/>
+                <a:ea typeface="Courier New" charset="0"/>
+                <a:cs typeface="Courier New" charset="0"/>
+              </a:rPr>
+              <a:t>version</a:t>
+            </a:r>
+            <a:r>
+              <a:rPr lang="es-ES" dirty="0">
+                <a:solidFill>
+                  <a:srgbClr val="211F6B"/>
+                </a:solidFill>
+                <a:latin typeface="Courier New" charset="0"/>
+                <a:ea typeface="Courier New" charset="0"/>
+                <a:cs typeface="Courier New" charset="0"/>
+              </a:rPr>
+              <a:t> -&gt; </a:t>
+            </a:r>
+            <a:r>
+              <a:rPr lang="mr-IN" dirty="0" err="1">
+                <a:solidFill>
+                  <a:srgbClr val="211F6B"/>
+                </a:solidFill>
+                <a:latin typeface="Courier New" charset="0"/>
+                <a:ea typeface="Courier New" charset="0"/>
+                <a:cs typeface="Courier New" charset="0"/>
+              </a:rPr>
+              <a:t>heroku</a:t>
+            </a:r>
+            <a:r>
+              <a:rPr lang="mr-IN" dirty="0">
+                <a:solidFill>
+                  <a:srgbClr val="211F6B"/>
+                </a:solidFill>
+                <a:latin typeface="Courier New" charset="0"/>
+                <a:ea typeface="Courier New" charset="0"/>
+                <a:cs typeface="Courier New" charset="0"/>
+              </a:rPr>
+              <a:t>/7.19.3 linux-x64 node-v11.3.0</a:t>
+            </a:r>
+            <a:endParaRPr lang="es-ES" dirty="0">
               <a:solidFill>
                 <a:srgbClr val="211F6B"/>
               </a:solidFill>
@@ -3836,7 +3830,7 @@
           </a:p>
           <a:p>
             <a:r>
-              <a:rPr lang="en-US" b="1" dirty="0" smtClean="0">
+              <a:rPr lang="en-US" b="1" dirty="0">
                 <a:solidFill>
                   <a:srgbClr val="211F6B"/>
                 </a:solidFill>
@@ -3847,7 +3841,7 @@
               <a:t>After that we have the </a:t>
             </a:r>
             <a:r>
-              <a:rPr lang="en-US" b="1" dirty="0" err="1" smtClean="0">
+              <a:rPr lang="en-US" b="1" dirty="0" err="1">
                 <a:solidFill>
                   <a:srgbClr val="211F6B"/>
                 </a:solidFill>
@@ -3858,7 +3852,7 @@
               <a:t>heroku</a:t>
             </a:r>
             <a:r>
-              <a:rPr lang="en-US" b="1" dirty="0" smtClean="0">
+              <a:rPr lang="en-US" b="1" dirty="0">
                 <a:solidFill>
                   <a:srgbClr val="211F6B"/>
                 </a:solidFill>
@@ -3869,7 +3863,7 @@
               <a:t> command available in the terminal, log in using your </a:t>
             </a:r>
             <a:r>
-              <a:rPr lang="en-US" b="1" dirty="0" err="1" smtClean="0">
+              <a:rPr lang="en-US" b="1" dirty="0" err="1">
                 <a:solidFill>
                   <a:srgbClr val="211F6B"/>
                 </a:solidFill>
@@ -3880,7 +3874,7 @@
               <a:t>heroku</a:t>
             </a:r>
             <a:r>
-              <a:rPr lang="en-US" b="1" dirty="0" smtClean="0">
+              <a:rPr lang="en-US" b="1" dirty="0">
                 <a:solidFill>
                   <a:srgbClr val="211F6B"/>
                 </a:solidFill>
@@ -3902,49 +3896,37 @@
                 <a:ea typeface="Courier New" charset="0"/>
                 <a:cs typeface="Courier New" charset="0"/>
               </a:rPr>
-              <a:t>h</a:t>
-            </a:r>
-            <a:r>
-              <a:rPr lang="en-US" dirty="0" err="1" smtClean="0">
-                <a:solidFill>
-                  <a:srgbClr val="211F6B"/>
-                </a:solidFill>
-                <a:latin typeface="Courier New" charset="0"/>
-                <a:ea typeface="Courier New" charset="0"/>
-                <a:cs typeface="Courier New" charset="0"/>
-              </a:rPr>
-              <a:t>eroku</a:t>
-            </a:r>
-            <a:r>
-              <a:rPr lang="en-US" dirty="0" smtClean="0">
-                <a:solidFill>
-                  <a:srgbClr val="211F6B"/>
-                </a:solidFill>
-                <a:latin typeface="Courier New" charset="0"/>
-                <a:ea typeface="Courier New" charset="0"/>
-                <a:cs typeface="Courier New" charset="0"/>
-              </a:rPr>
-              <a:t> login</a:t>
-            </a:r>
-          </a:p>
-          <a:p>
-            <a:endParaRPr lang="en-US" b="1" dirty="0">
+              <a:t>heroku</a:t>
+            </a:r>
+            <a:r>
+              <a:rPr lang="en-US" dirty="0">
+                <a:solidFill>
+                  <a:srgbClr val="211F6B"/>
+                </a:solidFill>
+                <a:latin typeface="Courier New" charset="0"/>
+                <a:ea typeface="Courier New" charset="0"/>
+                <a:cs typeface="Courier New" charset="0"/>
+              </a:rPr>
+              <a:t> login -</a:t>
+            </a:r>
+            <a:r>
+              <a:rPr lang="en-US" dirty="0" err="1">
+                <a:solidFill>
+                  <a:srgbClr val="211F6B"/>
+                </a:solidFill>
+                <a:latin typeface="Courier New" charset="0"/>
+                <a:ea typeface="Courier New" charset="0"/>
+                <a:cs typeface="Courier New" charset="0"/>
+              </a:rPr>
+              <a:t>i</a:t>
+            </a:r>
+            <a:endParaRPr lang="en-US" dirty="0">
               <a:solidFill>
                 <a:srgbClr val="211F6B"/>
               </a:solidFill>
               <a:latin typeface="Courier New" charset="0"/>
               <a:ea typeface="Courier New" charset="0"/>
               <a:cs typeface="Courier New" charset="0"/>
-            </a:endParaRPr>
-          </a:p>
-          <a:p>
-            <a:endParaRPr lang="en-US" b="1" dirty="0">
-              <a:solidFill>
-                <a:srgbClr val="211F6B"/>
-              </a:solidFill>
-              <a:latin typeface="RawengulkSans" charset="0"/>
-              <a:ea typeface="RawengulkSans" charset="0"/>
-              <a:cs typeface="RawengulkSans" charset="0"/>
             </a:endParaRPr>
           </a:p>
         </p:txBody>
@@ -4590,7 +4572,29 @@
                 <a:ea typeface="Courier New" charset="0"/>
                 <a:cs typeface="Courier New" charset="0"/>
               </a:rPr>
-              <a:t>2.5.1”</a:t>
+              <a:t>2.5.</a:t>
+            </a:r>
+            <a:r>
+              <a:rPr lang="es-ES" dirty="0" smtClean="0">
+                <a:solidFill>
+                  <a:srgbClr val="211F6B"/>
+                </a:solidFill>
+                <a:latin typeface="Courier New" charset="0"/>
+                <a:ea typeface="Courier New" charset="0"/>
+                <a:cs typeface="Courier New" charset="0"/>
+              </a:rPr>
+              <a:t>3</a:t>
+            </a:r>
+            <a:r>
+              <a:rPr lang="es-ES" dirty="0" smtClean="0">
+                <a:solidFill>
+                  <a:srgbClr val="211F6B"/>
+                </a:solidFill>
+                <a:latin typeface="Courier New" charset="0"/>
+                <a:ea typeface="Courier New" charset="0"/>
+                <a:cs typeface="Courier New" charset="0"/>
+              </a:rPr>
+              <a:t>”</a:t>
             </a:r>
             <a:endParaRPr lang="es-ES" b="1" dirty="0" smtClean="0">
               <a:solidFill>

</xml_diff>

<commit_message>
Update the Heroku slides
</commit_message>
<xml_diff>
--- a/Section 10 - Heroku.pptx
+++ b/Section 10 - Heroku.pptx
@@ -250,7 +250,7 @@
           <a:p>
             <a:fld id="{C1B4A547-92C3-7C4C-BEB9-53C9435B0722}" type="datetimeFigureOut">
               <a:rPr lang="en-US" smtClean="0"/>
-              <a:t>12/14/18</a:t>
+              <a:t>2/21/19</a:t>
             </a:fld>
             <a:endParaRPr lang="en-US"/>
           </a:p>
@@ -292,7 +292,7 @@
           <a:p>
             <a:fld id="{1E782F10-997D-BD42-9043-E959FB05B85B}" type="slidenum">
               <a:rPr lang="en-US" smtClean="0"/>
-              <a:t>‹#›</a:t>
+              <a:t>‹Nr.›</a:t>
             </a:fld>
             <a:endParaRPr lang="en-US"/>
           </a:p>
@@ -420,7 +420,7 @@
           <a:p>
             <a:fld id="{C1B4A547-92C3-7C4C-BEB9-53C9435B0722}" type="datetimeFigureOut">
               <a:rPr lang="en-US" smtClean="0"/>
-              <a:t>12/14/18</a:t>
+              <a:t>2/21/19</a:t>
             </a:fld>
             <a:endParaRPr lang="en-US"/>
           </a:p>
@@ -462,7 +462,7 @@
           <a:p>
             <a:fld id="{1E782F10-997D-BD42-9043-E959FB05B85B}" type="slidenum">
               <a:rPr lang="en-US" smtClean="0"/>
-              <a:t>‹#›</a:t>
+              <a:t>‹Nr.›</a:t>
             </a:fld>
             <a:endParaRPr lang="en-US"/>
           </a:p>
@@ -600,7 +600,7 @@
           <a:p>
             <a:fld id="{C1B4A547-92C3-7C4C-BEB9-53C9435B0722}" type="datetimeFigureOut">
               <a:rPr lang="en-US" smtClean="0"/>
-              <a:t>12/14/18</a:t>
+              <a:t>2/21/19</a:t>
             </a:fld>
             <a:endParaRPr lang="en-US"/>
           </a:p>
@@ -642,7 +642,7 @@
           <a:p>
             <a:fld id="{1E782F10-997D-BD42-9043-E959FB05B85B}" type="slidenum">
               <a:rPr lang="en-US" smtClean="0"/>
-              <a:t>‹#›</a:t>
+              <a:t>‹Nr.›</a:t>
             </a:fld>
             <a:endParaRPr lang="en-US"/>
           </a:p>
@@ -770,7 +770,7 @@
           <a:p>
             <a:fld id="{C1B4A547-92C3-7C4C-BEB9-53C9435B0722}" type="datetimeFigureOut">
               <a:rPr lang="en-US" smtClean="0"/>
-              <a:t>12/14/18</a:t>
+              <a:t>2/21/19</a:t>
             </a:fld>
             <a:endParaRPr lang="en-US"/>
           </a:p>
@@ -812,7 +812,7 @@
           <a:p>
             <a:fld id="{1E782F10-997D-BD42-9043-E959FB05B85B}" type="slidenum">
               <a:rPr lang="en-US" smtClean="0"/>
-              <a:t>‹#›</a:t>
+              <a:t>‹Nr.›</a:t>
             </a:fld>
             <a:endParaRPr lang="en-US"/>
           </a:p>
@@ -1016,7 +1016,7 @@
           <a:p>
             <a:fld id="{C1B4A547-92C3-7C4C-BEB9-53C9435B0722}" type="datetimeFigureOut">
               <a:rPr lang="en-US" smtClean="0"/>
-              <a:t>12/14/18</a:t>
+              <a:t>2/21/19</a:t>
             </a:fld>
             <a:endParaRPr lang="en-US"/>
           </a:p>
@@ -1058,7 +1058,7 @@
           <a:p>
             <a:fld id="{1E782F10-997D-BD42-9043-E959FB05B85B}" type="slidenum">
               <a:rPr lang="en-US" smtClean="0"/>
-              <a:t>‹#›</a:t>
+              <a:t>‹Nr.›</a:t>
             </a:fld>
             <a:endParaRPr lang="en-US"/>
           </a:p>
@@ -1248,7 +1248,7 @@
           <a:p>
             <a:fld id="{C1B4A547-92C3-7C4C-BEB9-53C9435B0722}" type="datetimeFigureOut">
               <a:rPr lang="en-US" smtClean="0"/>
-              <a:t>12/14/18</a:t>
+              <a:t>2/21/19</a:t>
             </a:fld>
             <a:endParaRPr lang="en-US"/>
           </a:p>
@@ -1290,7 +1290,7 @@
           <a:p>
             <a:fld id="{1E782F10-997D-BD42-9043-E959FB05B85B}" type="slidenum">
               <a:rPr lang="en-US" smtClean="0"/>
-              <a:t>‹#›</a:t>
+              <a:t>‹Nr.›</a:t>
             </a:fld>
             <a:endParaRPr lang="en-US"/>
           </a:p>
@@ -1615,7 +1615,7 @@
           <a:p>
             <a:fld id="{C1B4A547-92C3-7C4C-BEB9-53C9435B0722}" type="datetimeFigureOut">
               <a:rPr lang="en-US" smtClean="0"/>
-              <a:t>12/14/18</a:t>
+              <a:t>2/21/19</a:t>
             </a:fld>
             <a:endParaRPr lang="en-US"/>
           </a:p>
@@ -1657,7 +1657,7 @@
           <a:p>
             <a:fld id="{1E782F10-997D-BD42-9043-E959FB05B85B}" type="slidenum">
               <a:rPr lang="en-US" smtClean="0"/>
-              <a:t>‹#›</a:t>
+              <a:t>‹Nr.›</a:t>
             </a:fld>
             <a:endParaRPr lang="en-US"/>
           </a:p>
@@ -1733,7 +1733,7 @@
           <a:p>
             <a:fld id="{C1B4A547-92C3-7C4C-BEB9-53C9435B0722}" type="datetimeFigureOut">
               <a:rPr lang="en-US" smtClean="0"/>
-              <a:t>12/14/18</a:t>
+              <a:t>2/21/19</a:t>
             </a:fld>
             <a:endParaRPr lang="en-US"/>
           </a:p>
@@ -1775,7 +1775,7 @@
           <a:p>
             <a:fld id="{1E782F10-997D-BD42-9043-E959FB05B85B}" type="slidenum">
               <a:rPr lang="en-US" smtClean="0"/>
-              <a:t>‹#›</a:t>
+              <a:t>‹Nr.›</a:t>
             </a:fld>
             <a:endParaRPr lang="en-US"/>
           </a:p>
@@ -1828,7 +1828,7 @@
           <a:p>
             <a:fld id="{C1B4A547-92C3-7C4C-BEB9-53C9435B0722}" type="datetimeFigureOut">
               <a:rPr lang="en-US" smtClean="0"/>
-              <a:t>12/14/18</a:t>
+              <a:t>2/21/19</a:t>
             </a:fld>
             <a:endParaRPr lang="en-US"/>
           </a:p>
@@ -1870,7 +1870,7 @@
           <a:p>
             <a:fld id="{1E782F10-997D-BD42-9043-E959FB05B85B}" type="slidenum">
               <a:rPr lang="en-US" smtClean="0"/>
-              <a:t>‹#›</a:t>
+              <a:t>‹Nr.›</a:t>
             </a:fld>
             <a:endParaRPr lang="en-US"/>
           </a:p>
@@ -2105,7 +2105,7 @@
           <a:p>
             <a:fld id="{C1B4A547-92C3-7C4C-BEB9-53C9435B0722}" type="datetimeFigureOut">
               <a:rPr lang="en-US" smtClean="0"/>
-              <a:t>12/14/18</a:t>
+              <a:t>2/21/19</a:t>
             </a:fld>
             <a:endParaRPr lang="en-US"/>
           </a:p>
@@ -2147,7 +2147,7 @@
           <a:p>
             <a:fld id="{1E782F10-997D-BD42-9043-E959FB05B85B}" type="slidenum">
               <a:rPr lang="en-US" smtClean="0"/>
-              <a:t>‹#›</a:t>
+              <a:t>‹Nr.›</a:t>
             </a:fld>
             <a:endParaRPr lang="en-US"/>
           </a:p>
@@ -2358,7 +2358,7 @@
           <a:p>
             <a:fld id="{C1B4A547-92C3-7C4C-BEB9-53C9435B0722}" type="datetimeFigureOut">
               <a:rPr lang="en-US" smtClean="0"/>
-              <a:t>12/14/18</a:t>
+              <a:t>2/21/19</a:t>
             </a:fld>
             <a:endParaRPr lang="en-US"/>
           </a:p>
@@ -2400,7 +2400,7 @@
           <a:p>
             <a:fld id="{1E782F10-997D-BD42-9043-E959FB05B85B}" type="slidenum">
               <a:rPr lang="en-US" smtClean="0"/>
-              <a:t>‹#›</a:t>
+              <a:t>‹Nr.›</a:t>
             </a:fld>
             <a:endParaRPr lang="en-US"/>
           </a:p>
@@ -2571,7 +2571,7 @@
           <a:p>
             <a:fld id="{C1B4A547-92C3-7C4C-BEB9-53C9435B0722}" type="datetimeFigureOut">
               <a:rPr lang="en-US" smtClean="0"/>
-              <a:t>12/14/18</a:t>
+              <a:t>2/21/19</a:t>
             </a:fld>
             <a:endParaRPr lang="en-US"/>
           </a:p>
@@ -2649,7 +2649,7 @@
           <a:p>
             <a:fld id="{1E782F10-997D-BD42-9043-E959FB05B85B}" type="slidenum">
               <a:rPr lang="en-US" smtClean="0"/>
-              <a:t>‹#›</a:t>
+              <a:t>‹Nr.›</a:t>
             </a:fld>
             <a:endParaRPr lang="en-US"/>
           </a:p>
@@ -4561,7 +4561,7 @@
                 <a:ea typeface="Courier New" charset="0"/>
                 <a:cs typeface="Courier New" charset="0"/>
               </a:rPr>
-              <a:t> "</a:t>
+              <a:t> </a:t>
             </a:r>
             <a:r>
               <a:rPr lang="mr-IN" dirty="0" smtClean="0">
@@ -4572,7 +4572,7 @@
                 <a:ea typeface="Courier New" charset="0"/>
                 <a:cs typeface="Courier New" charset="0"/>
               </a:rPr>
-              <a:t>2.5.</a:t>
+              <a:t>”</a:t>
             </a:r>
             <a:r>
               <a:rPr lang="es-ES" dirty="0" smtClean="0">
@@ -4583,18 +4583,7 @@
                 <a:ea typeface="Courier New" charset="0"/>
                 <a:cs typeface="Courier New" charset="0"/>
               </a:rPr>
-              <a:t>3</a:t>
-            </a:r>
-            <a:r>
-              <a:rPr lang="es-ES" dirty="0" smtClean="0">
-                <a:solidFill>
-                  <a:srgbClr val="211F6B"/>
-                </a:solidFill>
-                <a:latin typeface="Courier New" charset="0"/>
-                <a:ea typeface="Courier New" charset="0"/>
-                <a:cs typeface="Courier New" charset="0"/>
-              </a:rPr>
-              <a:t>”</a:t>
+              <a:t>2.6.1”</a:t>
             </a:r>
             <a:endParaRPr lang="es-ES" b="1" dirty="0" smtClean="0">
               <a:solidFill>
@@ -7302,7 +7291,7 @@
         <p:spPr/>
         <p:txBody>
           <a:bodyPr>
-            <a:normAutofit fontScale="62500" lnSpcReduction="20000"/>
+            <a:normAutofit fontScale="55000" lnSpcReduction="20000"/>
           </a:bodyPr>
           <a:lstStyle/>
           <a:p>
@@ -7800,7 +7789,7 @@
               <a:t>https://</a:t>
             </a:r>
             <a:r>
-              <a:rPr lang="es-ES" b="1" smtClean="0">
+              <a:rPr lang="es-ES" b="1" dirty="0" smtClean="0">
                 <a:solidFill>
                   <a:srgbClr val="211F6B"/>
                 </a:solidFill>
@@ -7812,7 +7801,7 @@
               <a:t>redis.io/topics/pubsub#database-amp-scoping</a:t>
             </a:r>
             <a:r>
-              <a:rPr lang="es-ES" b="1" smtClean="0">
+              <a:rPr lang="es-ES" b="1" dirty="0" smtClean="0">
                 <a:solidFill>
                   <a:srgbClr val="211F6B"/>
                 </a:solidFill>
@@ -8237,6 +8226,316 @@
           </a:p>
           <a:p>
             <a:pPr lvl="1"/>
+            <a:r>
+              <a:rPr lang="es-ES" dirty="0" smtClean="0">
+                <a:solidFill>
+                  <a:srgbClr val="211F6B"/>
+                </a:solidFill>
+                <a:latin typeface="Courier New" charset="0"/>
+                <a:ea typeface="Courier New" charset="0"/>
+                <a:cs typeface="Courier New" charset="0"/>
+              </a:rPr>
+              <a:t>Ubuntu:</a:t>
+            </a:r>
+          </a:p>
+          <a:p>
+            <a:pPr lvl="2"/>
+            <a:r>
+              <a:rPr lang="es-ES" dirty="0">
+                <a:latin typeface="Courier New" charset="0"/>
+                <a:ea typeface="Courier New" charset="0"/>
+                <a:cs typeface="Courier New" charset="0"/>
+              </a:rPr>
+              <a:t>sudo </a:t>
+            </a:r>
+            <a:r>
+              <a:rPr lang="es-ES" dirty="0" err="1">
+                <a:latin typeface="Courier New" charset="0"/>
+                <a:ea typeface="Courier New" charset="0"/>
+                <a:cs typeface="Courier New" charset="0"/>
+              </a:rPr>
+              <a:t>apt</a:t>
+            </a:r>
+            <a:r>
+              <a:rPr lang="es-ES" dirty="0">
+                <a:latin typeface="Courier New" charset="0"/>
+                <a:ea typeface="Courier New" charset="0"/>
+                <a:cs typeface="Courier New" charset="0"/>
+              </a:rPr>
+              <a:t> </a:t>
+            </a:r>
+            <a:r>
+              <a:rPr lang="es-ES" dirty="0" err="1">
+                <a:latin typeface="Courier New" charset="0"/>
+                <a:ea typeface="Courier New" charset="0"/>
+                <a:cs typeface="Courier New" charset="0"/>
+              </a:rPr>
+              <a:t>update</a:t>
+            </a:r>
+            <a:r>
+              <a:rPr lang="es-ES" dirty="0">
+                <a:latin typeface="Courier New" charset="0"/>
+                <a:ea typeface="Courier New" charset="0"/>
+                <a:cs typeface="Courier New" charset="0"/>
+              </a:rPr>
+              <a:t> </a:t>
+            </a:r>
+          </a:p>
+          <a:p>
+            <a:pPr lvl="2"/>
+            <a:r>
+              <a:rPr lang="es-ES" dirty="0">
+                <a:latin typeface="Courier New" charset="0"/>
+                <a:ea typeface="Courier New" charset="0"/>
+                <a:cs typeface="Courier New" charset="0"/>
+              </a:rPr>
+              <a:t>sudo </a:t>
+            </a:r>
+            <a:r>
+              <a:rPr lang="es-ES" dirty="0" err="1">
+                <a:latin typeface="Courier New" charset="0"/>
+                <a:ea typeface="Courier New" charset="0"/>
+                <a:cs typeface="Courier New" charset="0"/>
+              </a:rPr>
+              <a:t>apt</a:t>
+            </a:r>
+            <a:r>
+              <a:rPr lang="es-ES" dirty="0">
+                <a:latin typeface="Courier New" charset="0"/>
+                <a:ea typeface="Courier New" charset="0"/>
+                <a:cs typeface="Courier New" charset="0"/>
+              </a:rPr>
+              <a:t> </a:t>
+            </a:r>
+            <a:r>
+              <a:rPr lang="es-ES" dirty="0" err="1">
+                <a:latin typeface="Courier New" charset="0"/>
+                <a:ea typeface="Courier New" charset="0"/>
+                <a:cs typeface="Courier New" charset="0"/>
+              </a:rPr>
+              <a:t>install</a:t>
+            </a:r>
+            <a:r>
+              <a:rPr lang="es-ES" dirty="0">
+                <a:latin typeface="Courier New" charset="0"/>
+                <a:ea typeface="Courier New" charset="0"/>
+                <a:cs typeface="Courier New" charset="0"/>
+              </a:rPr>
+              <a:t> </a:t>
+            </a:r>
+            <a:r>
+              <a:rPr lang="es-ES" dirty="0" err="1" smtClean="0">
+                <a:latin typeface="Courier New" charset="0"/>
+                <a:ea typeface="Courier New" charset="0"/>
+                <a:cs typeface="Courier New" charset="0"/>
+              </a:rPr>
+              <a:t>redis</a:t>
+            </a:r>
+            <a:r>
+              <a:rPr lang="es-ES" dirty="0" smtClean="0">
+                <a:latin typeface="Courier New" charset="0"/>
+                <a:ea typeface="Courier New" charset="0"/>
+                <a:cs typeface="Courier New" charset="0"/>
+              </a:rPr>
+              <a:t>-server</a:t>
+            </a:r>
+          </a:p>
+          <a:p>
+            <a:pPr lvl="2"/>
+            <a:r>
+              <a:rPr lang="es-ES" dirty="0" smtClean="0">
+                <a:latin typeface="Courier New" charset="0"/>
+                <a:ea typeface="Courier New" charset="0"/>
+                <a:cs typeface="Courier New" charset="0"/>
+              </a:rPr>
+              <a:t>Open </a:t>
+            </a:r>
+            <a:r>
+              <a:rPr lang="es-ES" dirty="0" err="1" smtClean="0">
+                <a:latin typeface="Courier New" charset="0"/>
+                <a:ea typeface="Courier New" charset="0"/>
+                <a:cs typeface="Courier New" charset="0"/>
+              </a:rPr>
+              <a:t>the</a:t>
+            </a:r>
+            <a:r>
+              <a:rPr lang="es-ES" dirty="0" smtClean="0">
+                <a:latin typeface="Courier New" charset="0"/>
+                <a:ea typeface="Courier New" charset="0"/>
+                <a:cs typeface="Courier New" charset="0"/>
+              </a:rPr>
+              <a:t> </a:t>
+            </a:r>
+            <a:r>
+              <a:rPr lang="es-ES" dirty="0" err="1" smtClean="0">
+                <a:latin typeface="Courier New" charset="0"/>
+                <a:ea typeface="Courier New" charset="0"/>
+                <a:cs typeface="Courier New" charset="0"/>
+              </a:rPr>
+              <a:t>config</a:t>
+            </a:r>
+            <a:r>
+              <a:rPr lang="es-ES" dirty="0" smtClean="0">
+                <a:latin typeface="Courier New" charset="0"/>
+                <a:ea typeface="Courier New" charset="0"/>
+                <a:cs typeface="Courier New" charset="0"/>
+              </a:rPr>
+              <a:t> file </a:t>
+            </a:r>
+            <a:r>
+              <a:rPr lang="es-ES" dirty="0" err="1" smtClean="0">
+                <a:latin typeface="Courier New" charset="0"/>
+                <a:ea typeface="Courier New" charset="0"/>
+                <a:cs typeface="Courier New" charset="0"/>
+              </a:rPr>
+              <a:t>with</a:t>
+            </a:r>
+            <a:r>
+              <a:rPr lang="es-ES" dirty="0" smtClean="0">
+                <a:latin typeface="Courier New" charset="0"/>
+                <a:ea typeface="Courier New" charset="0"/>
+                <a:cs typeface="Courier New" charset="0"/>
+              </a:rPr>
+              <a:t> </a:t>
+            </a:r>
+            <a:r>
+              <a:rPr lang="es-ES" dirty="0"/>
+              <a:t>sudo nano /</a:t>
+            </a:r>
+            <a:r>
+              <a:rPr lang="es-ES" dirty="0" err="1" smtClean="0"/>
+              <a:t>etc</a:t>
+            </a:r>
+            <a:r>
+              <a:rPr lang="es-ES" dirty="0" smtClean="0"/>
+              <a:t>/</a:t>
+            </a:r>
+            <a:r>
+              <a:rPr lang="es-ES" dirty="0" err="1" smtClean="0"/>
+              <a:t>redis</a:t>
+            </a:r>
+            <a:r>
+              <a:rPr lang="es-ES" dirty="0" smtClean="0"/>
+              <a:t>/</a:t>
+            </a:r>
+            <a:r>
+              <a:rPr lang="es-ES" dirty="0" err="1" smtClean="0"/>
+              <a:t>redis.conf</a:t>
+            </a:r>
+            <a:endParaRPr lang="es-ES" dirty="0"/>
+          </a:p>
+          <a:p>
+            <a:pPr lvl="2"/>
+            <a:r>
+              <a:rPr lang="es-ES" dirty="0" smtClean="0">
+                <a:solidFill>
+                  <a:srgbClr val="211F6B"/>
+                </a:solidFill>
+                <a:latin typeface="Courier New" charset="0"/>
+                <a:ea typeface="Courier New" charset="0"/>
+                <a:cs typeface="Courier New" charset="0"/>
+              </a:rPr>
+              <a:t>And </a:t>
+            </a:r>
+            <a:r>
+              <a:rPr lang="es-ES" dirty="0" err="1" smtClean="0">
+                <a:solidFill>
+                  <a:srgbClr val="211F6B"/>
+                </a:solidFill>
+                <a:latin typeface="Courier New" charset="0"/>
+                <a:ea typeface="Courier New" charset="0"/>
+                <a:cs typeface="Courier New" charset="0"/>
+              </a:rPr>
+              <a:t>change</a:t>
+            </a:r>
+            <a:r>
+              <a:rPr lang="es-ES" dirty="0">
+                <a:solidFill>
+                  <a:srgbClr val="211F6B"/>
+                </a:solidFill>
+                <a:latin typeface="Courier New" charset="0"/>
+                <a:ea typeface="Courier New" charset="0"/>
+                <a:cs typeface="Courier New" charset="0"/>
+              </a:rPr>
+              <a:t> </a:t>
+            </a:r>
+            <a:r>
+              <a:rPr lang="es-ES" dirty="0" err="1">
+                <a:solidFill>
+                  <a:srgbClr val="211F6B"/>
+                </a:solidFill>
+                <a:latin typeface="Courier New" charset="0"/>
+                <a:ea typeface="Courier New" charset="0"/>
+                <a:cs typeface="Courier New" charset="0"/>
+              </a:rPr>
+              <a:t>supervised</a:t>
+            </a:r>
+            <a:r>
+              <a:rPr lang="es-ES" dirty="0">
+                <a:solidFill>
+                  <a:srgbClr val="211F6B"/>
+                </a:solidFill>
+                <a:latin typeface="Courier New" charset="0"/>
+                <a:ea typeface="Courier New" charset="0"/>
+                <a:cs typeface="Courier New" charset="0"/>
+              </a:rPr>
+              <a:t> </a:t>
+            </a:r>
+            <a:r>
+              <a:rPr lang="es-ES" dirty="0" err="1" smtClean="0">
+                <a:solidFill>
+                  <a:srgbClr val="211F6B"/>
+                </a:solidFill>
+                <a:latin typeface="Courier New" charset="0"/>
+                <a:ea typeface="Courier New" charset="0"/>
+                <a:cs typeface="Courier New" charset="0"/>
+              </a:rPr>
+              <a:t>on</a:t>
+            </a:r>
+            <a:r>
+              <a:rPr lang="es-ES" dirty="0">
+                <a:solidFill>
+                  <a:srgbClr val="211F6B"/>
+                </a:solidFill>
+                <a:latin typeface="Courier New" charset="0"/>
+                <a:ea typeface="Courier New" charset="0"/>
+                <a:cs typeface="Courier New" charset="0"/>
+              </a:rPr>
+              <a:t> to </a:t>
+            </a:r>
+            <a:r>
+              <a:rPr lang="es-ES" dirty="0" err="1">
+                <a:solidFill>
+                  <a:srgbClr val="211F6B"/>
+                </a:solidFill>
+                <a:latin typeface="Courier New" charset="0"/>
+                <a:ea typeface="Courier New" charset="0"/>
+                <a:cs typeface="Courier New" charset="0"/>
+              </a:rPr>
+              <a:t>supervised</a:t>
+            </a:r>
+            <a:r>
+              <a:rPr lang="es-ES" dirty="0">
+                <a:solidFill>
+                  <a:srgbClr val="211F6B"/>
+                </a:solidFill>
+                <a:latin typeface="Courier New" charset="0"/>
+                <a:ea typeface="Courier New" charset="0"/>
+                <a:cs typeface="Courier New" charset="0"/>
+              </a:rPr>
+              <a:t> </a:t>
+            </a:r>
+            <a:r>
+              <a:rPr lang="es-ES" dirty="0" err="1">
+                <a:solidFill>
+                  <a:srgbClr val="211F6B"/>
+                </a:solidFill>
+                <a:latin typeface="Courier New" charset="0"/>
+                <a:ea typeface="Courier New" charset="0"/>
+                <a:cs typeface="Courier New" charset="0"/>
+              </a:rPr>
+              <a:t>systemd</a:t>
+            </a:r>
             <a:endParaRPr lang="es-ES" dirty="0" smtClean="0">
               <a:solidFill>
                 <a:srgbClr val="211F6B"/>

</xml_diff>